<commit_message>
Lecture 3 almost ready
I still need Kahoot
</commit_message>
<xml_diff>
--- a/Lectures/Lecture 2 Models.pptx
+++ b/Lectures/Lecture 2 Models.pptx
@@ -6877,7 +6877,7 @@
         </p:nvSpPr>
         <p:spPr>
           <a:xfrm>
-            <a:off x="0" y="0"/>
+            <a:off x="1" y="0"/>
             <a:ext cx="3078427" cy="513508"/>
           </a:xfrm>
           <a:prstGeom prst="rect">
@@ -6908,7 +6908,7 @@
         </p:nvSpPr>
         <p:spPr>
           <a:xfrm>
-            <a:off x="4023992" y="0"/>
+            <a:off x="4023993" y="0"/>
             <a:ext cx="3078427" cy="513508"/>
           </a:xfrm>
           <a:prstGeom prst="rect">
@@ -6925,7 +6925,7 @@
           <a:p>
             <a:fld id="{9CF176CD-15D1-4787-BBAA-B7F61FF9E394}" type="datetimeFigureOut">
               <a:rPr lang="en-GB" smtClean="0"/>
-              <a:t>26/03/2025</a:t>
+              <a:t>02/04/2025</a:t>
             </a:fld>
             <a:endParaRPr lang="en-GB"/>
           </a:p>
@@ -6976,7 +6976,7 @@
         </p:nvSpPr>
         <p:spPr>
           <a:xfrm>
-            <a:off x="710407" y="4925407"/>
+            <a:off x="710407" y="4925409"/>
             <a:ext cx="5683250" cy="4029879"/>
           </a:xfrm>
           <a:prstGeom prst="rect">
@@ -7036,7 +7036,7 @@
         </p:nvSpPr>
         <p:spPr>
           <a:xfrm>
-            <a:off x="0" y="9721107"/>
+            <a:off x="1" y="9721109"/>
             <a:ext cx="3078427" cy="513507"/>
           </a:xfrm>
           <a:prstGeom prst="rect">
@@ -7067,7 +7067,7 @@
         </p:nvSpPr>
         <p:spPr>
           <a:xfrm>
-            <a:off x="4023992" y="9721107"/>
+            <a:off x="4023993" y="9721109"/>
             <a:ext cx="3078427" cy="513507"/>
           </a:xfrm>
           <a:prstGeom prst="rect">
@@ -7324,7 +7324,7 @@
           <a:p>
             <a:fld id="{633AF1EE-65BA-4140-B6B9-7F82C437F84A}" type="datetimeFigureOut">
               <a:rPr lang="en-GB" smtClean="0"/>
-              <a:t>26/03/2025</a:t>
+              <a:t>02/04/2025</a:t>
             </a:fld>
             <a:endParaRPr lang="en-GB"/>
           </a:p>
@@ -7494,7 +7494,7 @@
           <a:p>
             <a:fld id="{633AF1EE-65BA-4140-B6B9-7F82C437F84A}" type="datetimeFigureOut">
               <a:rPr lang="en-GB" smtClean="0"/>
-              <a:t>26/03/2025</a:t>
+              <a:t>02/04/2025</a:t>
             </a:fld>
             <a:endParaRPr lang="en-GB"/>
           </a:p>
@@ -7674,7 +7674,7 @@
           <a:p>
             <a:fld id="{633AF1EE-65BA-4140-B6B9-7F82C437F84A}" type="datetimeFigureOut">
               <a:rPr lang="en-GB" smtClean="0"/>
-              <a:t>26/03/2025</a:t>
+              <a:t>02/04/2025</a:t>
             </a:fld>
             <a:endParaRPr lang="en-GB"/>
           </a:p>
@@ -7844,7 +7844,7 @@
           <a:p>
             <a:fld id="{633AF1EE-65BA-4140-B6B9-7F82C437F84A}" type="datetimeFigureOut">
               <a:rPr lang="en-GB" smtClean="0"/>
-              <a:t>26/03/2025</a:t>
+              <a:t>02/04/2025</a:t>
             </a:fld>
             <a:endParaRPr lang="en-GB"/>
           </a:p>
@@ -8090,7 +8090,7 @@
           <a:p>
             <a:fld id="{633AF1EE-65BA-4140-B6B9-7F82C437F84A}" type="datetimeFigureOut">
               <a:rPr lang="en-GB" smtClean="0"/>
-              <a:t>26/03/2025</a:t>
+              <a:t>02/04/2025</a:t>
             </a:fld>
             <a:endParaRPr lang="en-GB"/>
           </a:p>
@@ -8322,7 +8322,7 @@
           <a:p>
             <a:fld id="{633AF1EE-65BA-4140-B6B9-7F82C437F84A}" type="datetimeFigureOut">
               <a:rPr lang="en-GB" smtClean="0"/>
-              <a:t>26/03/2025</a:t>
+              <a:t>02/04/2025</a:t>
             </a:fld>
             <a:endParaRPr lang="en-GB"/>
           </a:p>
@@ -8689,7 +8689,7 @@
           <a:p>
             <a:fld id="{633AF1EE-65BA-4140-B6B9-7F82C437F84A}" type="datetimeFigureOut">
               <a:rPr lang="en-GB" smtClean="0"/>
-              <a:t>26/03/2025</a:t>
+              <a:t>02/04/2025</a:t>
             </a:fld>
             <a:endParaRPr lang="en-GB"/>
           </a:p>
@@ -8807,7 +8807,7 @@
           <a:p>
             <a:fld id="{633AF1EE-65BA-4140-B6B9-7F82C437F84A}" type="datetimeFigureOut">
               <a:rPr lang="en-GB" smtClean="0"/>
-              <a:t>26/03/2025</a:t>
+              <a:t>02/04/2025</a:t>
             </a:fld>
             <a:endParaRPr lang="en-GB"/>
           </a:p>
@@ -8902,7 +8902,7 @@
           <a:p>
             <a:fld id="{633AF1EE-65BA-4140-B6B9-7F82C437F84A}" type="datetimeFigureOut">
               <a:rPr lang="en-GB" smtClean="0"/>
-              <a:t>26/03/2025</a:t>
+              <a:t>02/04/2025</a:t>
             </a:fld>
             <a:endParaRPr lang="en-GB"/>
           </a:p>
@@ -9179,7 +9179,7 @@
           <a:p>
             <a:fld id="{633AF1EE-65BA-4140-B6B9-7F82C437F84A}" type="datetimeFigureOut">
               <a:rPr lang="en-GB" smtClean="0"/>
-              <a:t>26/03/2025</a:t>
+              <a:t>02/04/2025</a:t>
             </a:fld>
             <a:endParaRPr lang="en-GB"/>
           </a:p>
@@ -9432,7 +9432,7 @@
           <a:p>
             <a:fld id="{633AF1EE-65BA-4140-B6B9-7F82C437F84A}" type="datetimeFigureOut">
               <a:rPr lang="en-GB" smtClean="0"/>
-              <a:t>26/03/2025</a:t>
+              <a:t>02/04/2025</a:t>
             </a:fld>
             <a:endParaRPr lang="en-GB"/>
           </a:p>
@@ -9645,7 +9645,7 @@
           <a:p>
             <a:fld id="{633AF1EE-65BA-4140-B6B9-7F82C437F84A}" type="datetimeFigureOut">
               <a:rPr lang="en-GB" smtClean="0"/>
-              <a:t>26/03/2025</a:t>
+              <a:t>02/04/2025</a:t>
             </a:fld>
             <a:endParaRPr lang="en-GB"/>
           </a:p>

</xml_diff>